<commit_message>
fix - metricas de bugs e dt de cada tribo agora estão sendo somadas corretamente
</commit_message>
<xml_diff>
--- a/Noviembre - Deck de Metricas.pptx
+++ b/Noviembre - Deck de Metricas.pptx
@@ -29382,11 +29382,11 @@
                         </a:defRPr>
                       </a:pPr>
                       <a:r>
-                        <a:t>🔴 17d 8h</a:t>
+                        <a:t>🔴 17d</a:t>
                       </a:r>
                       <a:br/>
                       <a:r>
-                        <a:t> (⬇ + 5d 3h)</a:t>
+                        <a:t> (⬇ + 4d 19h)</a:t>
                       </a:r>
                     </a:p>
                   </a:txBody>
@@ -29436,7 +29436,7 @@
                         </a:defRPr>
                       </a:pPr>
                       <a:r>
-                        <a:t>20 / 1</a:t>
+                        <a:t>21 / 1</a:t>
                       </a:r>
                     </a:p>
                   </a:txBody>
@@ -29486,7 +29486,7 @@
                         </a:defRPr>
                       </a:pPr>
                       <a:r>
-                        <a:t>35 / 14</a:t>
+                        <a:t>35 / 15</a:t>
                       </a:r>
                     </a:p>
                   </a:txBody>
@@ -29536,7 +29536,7 @@
                         </a:defRPr>
                       </a:pPr>
                       <a:r>
-                        <a:t>70 (51 - 15 - 4)</a:t>
+                        <a:t>75 (55 - 15 - 5)</a:t>
                       </a:r>
                     </a:p>
                   </a:txBody>
@@ -29586,7 +29586,7 @@
                         </a:defRPr>
                       </a:pPr>
                       <a:r>
-                        <a:t>73.77% - 20.68% - 5.56%</a:t>
+                        <a:t>78.15% - 15.68% - 6.17%</a:t>
                       </a:r>
                     </a:p>
                   </a:txBody>
@@ -29696,11 +29696,11 @@
                         </a:defRPr>
                       </a:pPr>
                       <a:r>
-                        <a:t>🟡 8d 16h</a:t>
+                        <a:t>🟡 8d 15h</a:t>
                       </a:r>
                       <a:br/>
                       <a:r>
-                        <a:t> (⬆ - 5d 10h)</a:t>
+                        <a:t> (⬆ - 5d 11h)</a:t>
                       </a:r>
                     </a:p>
                   </a:txBody>
@@ -29800,7 +29800,7 @@
                         </a:defRPr>
                       </a:pPr>
                       <a:r>
-                        <a:t>13 / 8</a:t>
+                        <a:t>16 / 8</a:t>
                       </a:r>
                     </a:p>
                   </a:txBody>
@@ -29850,7 +29850,7 @@
                         </a:defRPr>
                       </a:pPr>
                       <a:r>
-                        <a:t>169 (123 - 28 - 18)</a:t>
+                        <a:t>174 (128 - 28 - 18)</a:t>
                       </a:r>
                     </a:p>
                   </a:txBody>
@@ -29900,7 +29900,7 @@
                         </a:defRPr>
                       </a:pPr>
                       <a:r>
-                        <a:t>83.58% - 11.82% - 4.6%</a:t>
+                        <a:t>85.29% - 10.56% - 4.16%</a:t>
                       </a:r>
                     </a:p>
                   </a:txBody>
@@ -30010,11 +30010,11 @@
                         </a:defRPr>
                       </a:pPr>
                       <a:r>
-                        <a:t>🟡 9d 18h</a:t>
+                        <a:t>🟡 9d 14h</a:t>
                       </a:r>
                       <a:br/>
                       <a:r>
-                        <a:t> (⬇ + 8d 18h)</a:t>
+                        <a:t> (⬇ + 8d 14h)</a:t>
                       </a:r>
                     </a:p>
                   </a:txBody>
@@ -30114,7 +30114,7 @@
                         </a:defRPr>
                       </a:pPr>
                       <a:r>
-                        <a:t>3 / 4</a:t>
+                        <a:t>0 / 0</a:t>
                       </a:r>
                     </a:p>
                   </a:txBody>
@@ -30214,7 +30214,7 @@
                         </a:defRPr>
                       </a:pPr>
                       <a:r>
-                        <a:t>74.16% - 18.82% - 7.02%</a:t>
+                        <a:t>77.17% - 16.63% - 6.2%</a:t>
                       </a:r>
                     </a:p>
                   </a:txBody>
@@ -30377,11 +30377,11 @@
                         </a:defRPr>
                       </a:pPr>
                       <a:r>
-                        <a:t>🟡 8d</a:t>
+                        <a:t>🔴 15d 9h</a:t>
                       </a:r>
                       <a:br/>
                       <a:r>
-                        <a:t> (⬆ - 2d 19h)</a:t>
+                        <a:t> (⬇ + 4d 12h)</a:t>
                       </a:r>
                     </a:p>
                   </a:txBody>
@@ -30439,7 +30439,7 @@
                         </a:defRPr>
                       </a:pPr>
                       <a:r>
-                        <a:t>12 / 0</a:t>
+                        <a:t>0 / 0</a:t>
                       </a:r>
                     </a:p>
                   </a:txBody>
@@ -30497,7 +30497,7 @@
                         </a:defRPr>
                       </a:pPr>
                       <a:r>
-                        <a:t>9 / 12</a:t>
+                        <a:t>0 / 0</a:t>
                       </a:r>
                     </a:p>
                   </a:txBody>
@@ -30555,7 +30555,7 @@
                         </a:defRPr>
                       </a:pPr>
                       <a:r>
-                        <a:t>21 (6 - 12 - 3)</a:t>
+                        <a:t>22 (6 - 13 - 3)</a:t>
                       </a:r>
                     </a:p>
                   </a:txBody>
@@ -30613,7 +30613,7 @@
                         </a:defRPr>
                       </a:pPr>
                       <a:r>
-                        <a:t>75.9% - 5.36% - 18.74%</a:t>
+                        <a:t>75.39% - 5.6% - 19.01%</a:t>
                       </a:r>
                     </a:p>
                   </a:txBody>
@@ -30751,7 +30751,7 @@
                       </a:r>
                       <a:br/>
                       <a:r>
-                        <a:t> (⬆ - 8h 7m)</a:t>
+                        <a:t> (⬆ - 7h 55m)</a:t>
                       </a:r>
                     </a:p>
                   </a:txBody>
@@ -30801,7 +30801,7 @@
                         </a:defRPr>
                       </a:pPr>
                       <a:r>
-                        <a:t>22 / 3</a:t>
+                        <a:t>21 / 4</a:t>
                       </a:r>
                     </a:p>
                   </a:txBody>
@@ -30851,7 +30851,7 @@
                         </a:defRPr>
                       </a:pPr>
                       <a:r>
-                        <a:t>9 / 4</a:t>
+                        <a:t>8 / 5</a:t>
                       </a:r>
                     </a:p>
                   </a:txBody>
@@ -30901,7 +30901,7 @@
                         </a:defRPr>
                       </a:pPr>
                       <a:r>
-                        <a:t>92 (58 - 23 - 11)</a:t>
+                        <a:t>96 (62 - 23 - 11)</a:t>
                       </a:r>
                     </a:p>
                   </a:txBody>
@@ -30951,7 +30951,7 @@
                         </a:defRPr>
                       </a:pPr>
                       <a:r>
-                        <a:t>86.46% - 7.28% - 6.26%</a:t>
+                        <a:t>87.13% - 6.89% - 5.98%</a:t>
                       </a:r>
                     </a:p>
                   </a:txBody>
@@ -31180,7 +31180,7 @@
                         </a:defRPr>
                       </a:pPr>
                       <a:r>
-                        <a:t>7 / 16</a:t>
+                        <a:t>0 / 17</a:t>
                       </a:r>
                     </a:p>
                   </a:txBody>
@@ -31443,11 +31443,11 @@
                         </a:defRPr>
                       </a:pPr>
                       <a:r>
-                        <a:t>🟢 2d 5h</a:t>
+                        <a:t>🟢 2d 4h</a:t>
                       </a:r>
                       <a:br/>
                       <a:r>
-                        <a:t> (⬇ + 17h 28m)</a:t>
+                        <a:t> (⬇ + 16h 8m)</a:t>
                       </a:r>
                     </a:p>
                   </a:txBody>
@@ -31617,7 +31617,7 @@
                         </a:defRPr>
                       </a:pPr>
                       <a:r>
-                        <a:t>16 (12 - 4 - 0)</a:t>
+                        <a:t>17 (12 - 5 - 0)</a:t>
                       </a:r>
                     </a:p>
                   </a:txBody>
@@ -31675,7 +31675,7 @@
                         </a:defRPr>
                       </a:pPr>
                       <a:r>
-                        <a:t>80.9% - 3.71% - 15.39%</a:t>
+                        <a:t>80.87% - 3.67% - 15.46%</a:t>
                       </a:r>
                     </a:p>
                   </a:txBody>
@@ -31820,11 +31820,11 @@
                         </a:defRPr>
                       </a:pPr>
                       <a:r>
-                        <a:t>🟡 7d 17h</a:t>
+                        <a:t>🟡 7d 15h</a:t>
                       </a:r>
                       <a:br/>
                       <a:r>
-                        <a:t> (⬆ - 1d 21h)</a:t>
+                        <a:t> (⬆ - 1d 22h)</a:t>
                       </a:r>
                     </a:p>
                   </a:txBody>
@@ -31986,7 +31986,7 @@
                         </a:defRPr>
                       </a:pPr>
                       <a:r>
-                        <a:t>42 (30 - 10 - 2)</a:t>
+                        <a:t>43 (31 - 10 - 2)</a:t>
                       </a:r>
                     </a:p>
                   </a:txBody>
@@ -32040,7 +32040,7 @@
                         </a:defRPr>
                       </a:pPr>
                       <a:r>
-                        <a:t>83.31% - 9.61% - 7.07%</a:t>
+                        <a:t>83.94% - 9.37% - 6.69%</a:t>
                       </a:r>
                     </a:p>
                   </a:txBody>
@@ -32193,11 +32193,11 @@
                         </a:defRPr>
                       </a:pPr>
                       <a:r>
-                        <a:t>🟡 9d 20h</a:t>
+                        <a:t>🟡 9d 6h</a:t>
                       </a:r>
                       <a:br/>
                       <a:r>
-                        <a:t> (⬇ + 1d 19h)</a:t>
+                        <a:t> (⬇ + 1d 5h)</a:t>
                       </a:r>
                     </a:p>
                   </a:txBody>
@@ -32247,7 +32247,7 @@
                         </a:defRPr>
                       </a:pPr>
                       <a:r>
-                        <a:t>1 / 1</a:t>
+                        <a:t>2 / 1</a:t>
                       </a:r>
                     </a:p>
                   </a:txBody>
@@ -32293,7 +32293,7 @@
                         </a:defRPr>
                       </a:pPr>
                       <a:r>
-                        <a:t>0 / 0</a:t>
+                        <a:t>1 / 0</a:t>
                       </a:r>
                     </a:p>
                   </a:txBody>
@@ -32339,7 +32339,7 @@
                         </a:defRPr>
                       </a:pPr>
                       <a:r>
-                        <a:t>38 (17 - 12 - 9)</a:t>
+                        <a:t>39 (18 - 12 - 9)</a:t>
                       </a:r>
                     </a:p>
                   </a:txBody>
@@ -32385,7 +32385,7 @@
                         </a:defRPr>
                       </a:pPr>
                       <a:r>
-                        <a:t>68.06% - 9.35% - 22.59%</a:t>
+                        <a:t>68.1% - 9.82% - 22.08%</a:t>
                       </a:r>
                     </a:p>
                   </a:txBody>

</xml_diff>

<commit_message>
ajuste de posicionamento do template add comparativo nas posicoes abaixo
</commit_message>
<xml_diff>
--- a/Noviembre - Deck de Metricas.pptx
+++ b/Noviembre - Deck de Metricas.pptx
@@ -204,7 +204,7 @@
           <a:p>
             <a:fld id="{12582E09-F5B8-46D0-B640-243714D5C667}" type="datetimeFigureOut">
               <a:rPr lang="es-PE" smtClean="0"/>
-              <a:t>29/11/23</a:t>
+              <a:t>4/12/23</a:t>
             </a:fld>
             <a:endParaRPr lang="es-PE"/>
           </a:p>
@@ -2911,7 +2911,7 @@
           <a:p>
             <a:fld id="{73BB2AB2-DBF2-40CC-99D7-E7E644EC008C}" type="datetimeFigureOut">
               <a:rPr lang="es-PE" smtClean="0"/>
-              <a:t>29/11/23</a:t>
+              <a:t>4/12/23</a:t>
             </a:fld>
             <a:endParaRPr lang="es-PE"/>
           </a:p>
@@ -3187,7 +3187,7 @@
           <a:p>
             <a:fld id="{73BB2AB2-DBF2-40CC-99D7-E7E644EC008C}" type="datetimeFigureOut">
               <a:rPr lang="es-PE" smtClean="0"/>
-              <a:t>29/11/23</a:t>
+              <a:t>4/12/23</a:t>
             </a:fld>
             <a:endParaRPr lang="es-PE"/>
           </a:p>
@@ -3455,7 +3455,7 @@
           <a:p>
             <a:fld id="{73BB2AB2-DBF2-40CC-99D7-E7E644EC008C}" type="datetimeFigureOut">
               <a:rPr lang="es-PE" smtClean="0"/>
-              <a:t>29/11/23</a:t>
+              <a:t>4/12/23</a:t>
             </a:fld>
             <a:endParaRPr lang="es-PE"/>
           </a:p>
@@ -3870,7 +3870,7 @@
           <a:p>
             <a:fld id="{73BB2AB2-DBF2-40CC-99D7-E7E644EC008C}" type="datetimeFigureOut">
               <a:rPr lang="es-PE" smtClean="0"/>
-              <a:t>29/11/23</a:t>
+              <a:t>4/12/23</a:t>
             </a:fld>
             <a:endParaRPr lang="es-PE"/>
           </a:p>
@@ -4012,7 +4012,7 @@
           <a:p>
             <a:fld id="{73BB2AB2-DBF2-40CC-99D7-E7E644EC008C}" type="datetimeFigureOut">
               <a:rPr lang="es-PE" smtClean="0"/>
-              <a:t>29/11/23</a:t>
+              <a:t>4/12/23</a:t>
             </a:fld>
             <a:endParaRPr lang="es-PE"/>
           </a:p>
@@ -4191,7 +4191,7 @@
           <a:p>
             <a:fld id="{73BB2AB2-DBF2-40CC-99D7-E7E644EC008C}" type="datetimeFigureOut">
               <a:rPr lang="es-PE" smtClean="0"/>
-              <a:t>29/11/23</a:t>
+              <a:t>4/12/23</a:t>
             </a:fld>
             <a:endParaRPr lang="es-PE"/>
           </a:p>
@@ -4504,7 +4504,7 @@
           <a:p>
             <a:fld id="{73BB2AB2-DBF2-40CC-99D7-E7E644EC008C}" type="datetimeFigureOut">
               <a:rPr lang="es-PE" smtClean="0"/>
-              <a:t>29/11/23</a:t>
+              <a:t>4/12/23</a:t>
             </a:fld>
             <a:endParaRPr lang="es-PE"/>
           </a:p>
@@ -4793,7 +4793,7 @@
           <a:p>
             <a:fld id="{73BB2AB2-DBF2-40CC-99D7-E7E644EC008C}" type="datetimeFigureOut">
               <a:rPr lang="es-PE" smtClean="0"/>
-              <a:t>29/11/23</a:t>
+              <a:t>4/12/23</a:t>
             </a:fld>
             <a:endParaRPr lang="es-PE"/>
           </a:p>
@@ -4993,7 +4993,7 @@
           <a:p>
             <a:fld id="{73BB2AB2-DBF2-40CC-99D7-E7E644EC008C}" type="datetimeFigureOut">
               <a:rPr lang="es-PE" smtClean="0"/>
-              <a:t>29/11/23</a:t>
+              <a:t>4/12/23</a:t>
             </a:fld>
             <a:endParaRPr lang="es-PE"/>
           </a:p>
@@ -5203,7 +5203,7 @@
           <a:p>
             <a:fld id="{73BB2AB2-DBF2-40CC-99D7-E7E644EC008C}" type="datetimeFigureOut">
               <a:rPr lang="es-PE" smtClean="0"/>
-              <a:t>29/11/23</a:t>
+              <a:t>4/12/23</a:t>
             </a:fld>
             <a:endParaRPr lang="es-PE"/>
           </a:p>
@@ -5436,7 +5436,7 @@
           <a:p>
             <a:fld id="{1D8BD707-D9CF-40AE-B4C6-C98DA3205C09}" type="datetimeFigureOut">
               <a:rPr lang="en-US"/>
-              <a:t>11/29/23</a:t>
+              <a:t>12/4/23</a:t>
             </a:fld>
             <a:endParaRPr lang="en-US"/>
           </a:p>
@@ -19379,7 +19379,7 @@
           <a:p>
             <a:fld id="{73BB2AB2-DBF2-40CC-99D7-E7E644EC008C}" type="datetimeFigureOut">
               <a:rPr lang="es-PE" smtClean="0"/>
-              <a:t>29/11/23</a:t>
+              <a:t>4/12/23</a:t>
             </a:fld>
             <a:endParaRPr lang="es-PE"/>
           </a:p>
@@ -28834,14 +28834,14 @@
           <p:nvPr>
             <p:extLst>
               <p:ext uri="{D42A27DB-BD31-4B8C-83A1-F6EECF244321}">
-                <p14:modId xmlns:p14="http://schemas.microsoft.com/office/powerpoint/2010/main" val="2037491893"/>
+                <p14:modId xmlns:p14="http://schemas.microsoft.com/office/powerpoint/2010/main" val="85081751"/>
               </p:ext>
             </p:extLst>
           </p:nvPr>
         </p:nvGraphicFramePr>
         <p:xfrm>
-          <a:off x="341586" y="1007241"/>
-          <a:ext cx="8660120" cy="5852859"/>
+          <a:off x="107256" y="1007241"/>
+          <a:ext cx="8945798" cy="5910277"/>
         </p:xfrm>
         <a:graphic>
           <a:graphicData uri="http://schemas.openxmlformats.org/drawingml/2006/table">
@@ -28850,49 +28850,49 @@
                 <a:tableStyleId>{F2DE63D5-997A-4646-A377-4702673A728D}</a:tableStyleId>
               </a:tblPr>
               <a:tblGrid>
-                <a:gridCol w="1237160">
+                <a:gridCol w="906475">
                   <a:extLst>
                     <a:ext uri="{9D8B030D-6E8A-4147-A177-3AD203B41FA5}">
                       <a16:colId xmlns:a16="http://schemas.microsoft.com/office/drawing/2014/main" val="3064209377"/>
                     </a:ext>
                   </a:extLst>
                 </a:gridCol>
-                <a:gridCol w="1237160">
+                <a:gridCol w="1352469">
                   <a:extLst>
                     <a:ext uri="{9D8B030D-6E8A-4147-A177-3AD203B41FA5}">
                       <a16:colId xmlns:a16="http://schemas.microsoft.com/office/drawing/2014/main" val="3571590421"/>
                     </a:ext>
                   </a:extLst>
                 </a:gridCol>
-                <a:gridCol w="1237160">
+                <a:gridCol w="1143482">
                   <a:extLst>
                     <a:ext uri="{9D8B030D-6E8A-4147-A177-3AD203B41FA5}">
                       <a16:colId xmlns:a16="http://schemas.microsoft.com/office/drawing/2014/main" val="3416381208"/>
                     </a:ext>
                   </a:extLst>
                 </a:gridCol>
-                <a:gridCol w="1237160">
+                <a:gridCol w="1210236">
                   <a:extLst>
                     <a:ext uri="{9D8B030D-6E8A-4147-A177-3AD203B41FA5}">
                       <a16:colId xmlns:a16="http://schemas.microsoft.com/office/drawing/2014/main" val="3461968550"/>
                     </a:ext>
                   </a:extLst>
                 </a:gridCol>
-                <a:gridCol w="1237160">
+                <a:gridCol w="1116106">
                   <a:extLst>
                     <a:ext uri="{9D8B030D-6E8A-4147-A177-3AD203B41FA5}">
                       <a16:colId xmlns:a16="http://schemas.microsoft.com/office/drawing/2014/main" val="3727708425"/>
                     </a:ext>
                   </a:extLst>
                 </a:gridCol>
-                <a:gridCol w="1237160">
+                <a:gridCol w="1169894">
                   <a:extLst>
                     <a:ext uri="{9D8B030D-6E8A-4147-A177-3AD203B41FA5}">
                       <a16:colId xmlns:a16="http://schemas.microsoft.com/office/drawing/2014/main" val="4167475316"/>
                     </a:ext>
                   </a:extLst>
                 </a:gridCol>
-                <a:gridCol w="1237160">
+                <a:gridCol w="2047136">
                   <a:extLst>
                     <a:ext uri="{9D8B030D-6E8A-4147-A177-3AD203B41FA5}">
                       <a16:colId xmlns:a16="http://schemas.microsoft.com/office/drawing/2014/main" val="1320025689"/>
@@ -28952,7 +28952,7 @@
                         <a:buNone/>
                       </a:pPr>
                       <a:r>
-                        <a:rPr lang="es-ES" sz="1100">
+                        <a:rPr lang="es-ES" sz="1100" dirty="0">
                           <a:latin typeface="Inter"/>
                         </a:rPr>
                         <a:t>Equipo</a:t>
@@ -29382,11 +29382,11 @@
                         </a:defRPr>
                       </a:pPr>
                       <a:r>
-                        <a:t>🟡 12d 6h</a:t>
+                        <a:t>🟡 11d 14h</a:t>
                       </a:r>
                       <a:br/>
                       <a:r>
-                        <a:t> (⬇ + 4d 3h)</a:t>
+                        <a:t> (⬇ + 3d 12h)</a:t>
                       </a:r>
                     </a:p>
                   </a:txBody>
@@ -29438,6 +29438,10 @@
                       <a:r>
                         <a:t>21 / 1</a:t>
                       </a:r>
+                      <a:br/>
+                      <a:r>
+                        <a:t> (⬇ + 12.0)</a:t>
+                      </a:r>
                     </a:p>
                   </a:txBody>
                   <a:tcPr anchor="ctr">
@@ -29487,6 +29491,10 @@
                       </a:pPr>
                       <a:r>
                         <a:t>35 / 15</a:t>
+                      </a:r>
+                      <a:br/>
+                      <a:r>
+                        <a:t> (⬇ + 4.0)</a:t>
                       </a:r>
                     </a:p>
                   </a:txBody>
@@ -29538,6 +29546,10 @@
                       <a:r>
                         <a:t>75 (55 - 15 - 5)</a:t>
                       </a:r>
+                      <a:br/>
+                      <a:r>
+                        <a:t> (=)</a:t>
+                      </a:r>
                     </a:p>
                   </a:txBody>
                   <a:tcPr anchor="ctr">
@@ -29586,7 +29598,11 @@
                         </a:defRPr>
                       </a:pPr>
                       <a:r>
-                        <a:t>76.76% - 18.35% - 4.89%</a:t>
+                        <a:t>73.14% - 21.45% - 5.41%</a:t>
+                      </a:r>
+                      <a:br/>
+                      <a:r>
+                        <a:t> (⬆ - 2.3% / ⬇ + 2.69%)</a:t>
                       </a:r>
                     </a:p>
                   </a:txBody>
@@ -29696,11 +29712,11 @@
                         </a:defRPr>
                       </a:pPr>
                       <a:r>
-                        <a:t>🔵 6d 5h</a:t>
+                        <a:t>🟡 6d 17h</a:t>
                       </a:r>
                       <a:br/>
                       <a:r>
-                        <a:t> (⬆ - 3d 12h)</a:t>
+                        <a:t> (⬆ - 5d 13h)</a:t>
                       </a:r>
                     </a:p>
                   </a:txBody>
@@ -29752,6 +29768,10 @@
                       <a:r>
                         <a:t>1 / 0</a:t>
                       </a:r>
+                      <a:br/>
+                      <a:r>
+                        <a:t> (⬇ + 1.0)</a:t>
+                      </a:r>
                     </a:p>
                   </a:txBody>
                   <a:tcPr anchor="ctr">
@@ -29801,6 +29821,10 @@
                       </a:pPr>
                       <a:r>
                         <a:t>16 / 8</a:t>
+                      </a:r>
+                      <a:br/>
+                      <a:r>
+                        <a:t> (⬇ + 1.0)</a:t>
                       </a:r>
                     </a:p>
                   </a:txBody>
@@ -29852,6 +29876,10 @@
                       <a:r>
                         <a:t>178 (130 - 30 - 18)</a:t>
                       </a:r>
+                      <a:br/>
+                      <a:r>
+                        <a:t> (⬇ + 9.0)</a:t>
+                      </a:r>
                     </a:p>
                   </a:txBody>
                   <a:tcPr anchor="ctr">
@@ -29900,7 +29928,11 @@
                         </a:defRPr>
                       </a:pPr>
                       <a:r>
-                        <a:t>85.44% - 10.46% - 4.11%</a:t>
+                        <a:t>84.57% - 11.11% - 4.32%</a:t>
+                      </a:r>
+                      <a:br/>
+                      <a:r>
+                        <a:t> (⬇ + 3.18% / ⬆ - 1.35%)</a:t>
                       </a:r>
                     </a:p>
                   </a:txBody>
@@ -30010,11 +30042,11 @@
                         </a:defRPr>
                       </a:pPr>
                       <a:r>
-                        <a:t>🟡 6d 12h</a:t>
+                        <a:t>🟡 9d 5h</a:t>
                       </a:r>
                       <a:br/>
                       <a:r>
-                        <a:t> (⬇ + 5d 18h)</a:t>
+                        <a:t> (⬇ + 8d 12h)</a:t>
                       </a:r>
                     </a:p>
                   </a:txBody>
@@ -30066,6 +30098,10 @@
                       <a:r>
                         <a:t>0 / 0</a:t>
                       </a:r>
+                      <a:br/>
+                      <a:r>
+                        <a:t> (=)</a:t>
+                      </a:r>
                     </a:p>
                   </a:txBody>
                   <a:tcPr anchor="ctr">
@@ -30115,6 +30151,10 @@
                       </a:pPr>
                       <a:r>
                         <a:t>0 / 0</a:t>
+                      </a:r>
+                      <a:br/>
+                      <a:r>
+                        <a:t> (=)</a:t>
                       </a:r>
                     </a:p>
                   </a:txBody>
@@ -30166,6 +30206,10 @@
                       <a:r>
                         <a:t>64 (30 - 27 - 7)</a:t>
                       </a:r>
+                      <a:br/>
+                      <a:r>
+                        <a:t> (⬆ - 7.0)</a:t>
+                      </a:r>
                     </a:p>
                   </a:txBody>
                   <a:tcPr anchor="ctr">
@@ -30214,7 +30258,11 @@
                         </a:defRPr>
                       </a:pPr>
                       <a:r>
-                        <a:t>79.02% - 15.04% - 5.94%</a:t>
+                        <a:t>78.95% - 14.75% - 6.3%</a:t>
+                      </a:r>
+                      <a:br/>
+                      <a:r>
+                        <a:t> (⬇ + 10.09% / ⬆ - 9.9%)</a:t>
                       </a:r>
                     </a:p>
                   </a:txBody>
@@ -30377,11 +30425,11 @@
                         </a:defRPr>
                       </a:pPr>
                       <a:r>
-                        <a:t>🟡 10d 18h</a:t>
+                        <a:t>🟡 11d 5h</a:t>
                       </a:r>
                       <a:br/>
                       <a:r>
-                        <a:t> (⬇ + 3d 8h)</a:t>
+                        <a:t> (⬇ + 3d 19h)</a:t>
                       </a:r>
                     </a:p>
                   </a:txBody>
@@ -30441,6 +30489,10 @@
                       <a:r>
                         <a:t>0 / 0</a:t>
                       </a:r>
+                      <a:br/>
+                      <a:r>
+                        <a:t> (=)</a:t>
+                      </a:r>
                     </a:p>
                   </a:txBody>
                   <a:tcPr anchor="ctr">
@@ -30498,6 +30550,10 @@
                       </a:pPr>
                       <a:r>
                         <a:t>0 / 0</a:t>
+                      </a:r>
+                      <a:br/>
+                      <a:r>
+                        <a:t> (=)</a:t>
                       </a:r>
                     </a:p>
                   </a:txBody>
@@ -30557,6 +30613,10 @@
                       <a:r>
                         <a:t>22 (6 - 13 - 3)</a:t>
                       </a:r>
+                      <a:br/>
+                      <a:r>
+                        <a:t> (=)</a:t>
+                      </a:r>
                     </a:p>
                   </a:txBody>
                   <a:tcPr anchor="ctr">
@@ -30613,7 +30673,11 @@
                         </a:defRPr>
                       </a:pPr>
                       <a:r>
-                        <a:t>75.53% - 5.47% - 19.0%</a:t>
+                        <a:t>77.13% - 4.22% - 18.65%</a:t>
+                      </a:r>
+                      <a:br/>
+                      <a:r>
+                        <a:t> (⬇ + 1.28% / ⬆ - 3.64%)</a:t>
                       </a:r>
                     </a:p>
                   </a:txBody>
@@ -30751,7 +30815,7 @@
                       </a:r>
                       <a:br/>
                       <a:r>
-                        <a:t> (⬇ + 31m)</a:t>
+                        <a:t> (⬇ + 1h 12m)</a:t>
                       </a:r>
                     </a:p>
                   </a:txBody>
@@ -30803,6 +30867,10 @@
                       <a:r>
                         <a:t>21 / 4</a:t>
                       </a:r>
+                      <a:br/>
+                      <a:r>
+                        <a:t> (⬇ + 2.0)</a:t>
+                      </a:r>
                     </a:p>
                   </a:txBody>
                   <a:tcPr anchor="ctr">
@@ -30852,6 +30920,10 @@
                       </a:pPr>
                       <a:r>
                         <a:t>8 / 5</a:t>
+                      </a:r>
+                      <a:br/>
+                      <a:r>
+                        <a:t> (⬆ - 1.0)</a:t>
                       </a:r>
                     </a:p>
                   </a:txBody>
@@ -30903,6 +30975,10 @@
                       <a:r>
                         <a:t>96 (62 - 23 - 11)</a:t>
                       </a:r>
+                      <a:br/>
+                      <a:r>
+                        <a:t> (⬆ - 1.0)</a:t>
+                      </a:r>
                     </a:p>
                   </a:txBody>
                   <a:tcPr anchor="ctr">
@@ -30951,7 +31027,11 @@
                         </a:defRPr>
                       </a:pPr>
                       <a:r>
-                        <a:t>87.13% - 6.89% - 5.98%</a:t>
+                        <a:t>86.15% - 7.41% - 6.45%</a:t>
+                      </a:r>
+                      <a:br/>
+                      <a:r>
+                        <a:t> (⬇ + 0.42% / ⬆ - 9.13%)</a:t>
                       </a:r>
                     </a:p>
                   </a:txBody>
@@ -31072,11 +31152,11 @@
                         </a:defRPr>
                       </a:pPr>
                       <a:r>
-                        <a:t>🔴 14d 7h</a:t>
+                        <a:t>🔴 15d 17h</a:t>
                       </a:r>
                       <a:br/>
                       <a:r>
-                        <a:t> (⬇ + 5d 16h)</a:t>
+                        <a:t> (⬇ + 7d 1h)</a:t>
                       </a:r>
                     </a:p>
                   </a:txBody>
@@ -31127,6 +31207,10 @@
                       </a:pPr>
                       <a:r>
                         <a:t>0 / 0</a:t>
+                      </a:r>
+                      <a:br/>
+                      <a:r>
+                        <a:t> (=)</a:t>
                       </a:r>
                     </a:p>
                   </a:txBody>
@@ -31182,6 +31266,10 @@
                       <a:r>
                         <a:t>0 / 17</a:t>
                       </a:r>
+                      <a:br/>
+                      <a:r>
+                        <a:t> (⬆ - 13.0)</a:t>
+                      </a:r>
                     </a:p>
                   </a:txBody>
                   <a:tcPr anchor="ctr">
@@ -31236,6 +31324,10 @@
                       <a:r>
                         <a:t>27 (17 - 8 - 2)</a:t>
                       </a:r>
+                      <a:br/>
+                      <a:r>
+                        <a:t> (⬇ + 4.0)</a:t>
+                      </a:r>
                     </a:p>
                   </a:txBody>
                   <a:tcPr anchor="ctr">
@@ -31288,7 +31380,11 @@
                         </a:defRPr>
                       </a:pPr>
                       <a:r>
-                        <a:t>78.75% - 16.0% - 5.25%</a:t>
+                        <a:t>79.34% - 15.63% - 5.03%</a:t>
+                      </a:r>
+                      <a:br/>
+                      <a:r>
+                        <a:t> (⬆ - 2.01% / ⬇ + 2.81%)</a:t>
                       </a:r>
                     </a:p>
                   </a:txBody>
@@ -31443,11 +31539,11 @@
                         </a:defRPr>
                       </a:pPr>
                       <a:r>
-                        <a:t>🟢 1d 14h</a:t>
+                        <a:t>🟢 1d 13h</a:t>
                       </a:r>
                       <a:br/>
                       <a:r>
-                        <a:t> (⬇ + 13h 24m)</a:t>
+                        <a:t> (⬇ + 12h 19m)</a:t>
                       </a:r>
                     </a:p>
                   </a:txBody>
@@ -31502,6 +31598,10 @@
                       </a:pPr>
                       <a:r>
                         <a:t>0 / 0</a:t>
+                      </a:r>
+                      <a:br/>
+                      <a:r>
+                        <a:t> (=)</a:t>
                       </a:r>
                     </a:p>
                   </a:txBody>
@@ -31561,6 +31661,10 @@
                       <a:r>
                         <a:t>0 / 0</a:t>
                       </a:r>
+                      <a:br/>
+                      <a:r>
+                        <a:t> (=)</a:t>
+                      </a:r>
                     </a:p>
                   </a:txBody>
                   <a:tcPr anchor="ctr">
@@ -31619,6 +31723,10 @@
                       <a:r>
                         <a:t>17 (12 - 5 - 0)</a:t>
                       </a:r>
+                      <a:br/>
+                      <a:r>
+                        <a:t> (=)</a:t>
+                      </a:r>
                     </a:p>
                   </a:txBody>
                   <a:tcPr anchor="ctr">
@@ -31675,7 +31783,11 @@
                         </a:defRPr>
                       </a:pPr>
                       <a:r>
-                        <a:t>80.33% - 3.42% - 16.25%</a:t>
+                        <a:t>81.02% - 3.51% - 15.47%</a:t>
+                      </a:r>
+                      <a:br/>
+                      <a:r>
+                        <a:t> (⬆ - 0.82% / ⬆ - 26.86%)</a:t>
                       </a:r>
                     </a:p>
                   </a:txBody>
@@ -31820,11 +31932,11 @@
                         </a:defRPr>
                       </a:pPr>
                       <a:r>
-                        <a:t>🔵 5d 13h</a:t>
+                        <a:t>🔵 5d 12h</a:t>
                       </a:r>
                       <a:br/>
                       <a:r>
-                        <a:t> (⬆ - 19h 29m)</a:t>
+                        <a:t> (⬆ - 2d 20h)</a:t>
                       </a:r>
                     </a:p>
                   </a:txBody>
@@ -31880,6 +31992,10 @@
                       <a:r>
                         <a:t>0 / 0</a:t>
                       </a:r>
+                      <a:br/>
+                      <a:r>
+                        <a:t> (=)</a:t>
+                      </a:r>
                     </a:p>
                   </a:txBody>
                   <a:tcPr anchor="ctr">
@@ -31933,6 +32049,10 @@
                       </a:pPr>
                       <a:r>
                         <a:t>0 / 0</a:t>
+                      </a:r>
+                      <a:br/>
+                      <a:r>
+                        <a:t> (=)</a:t>
                       </a:r>
                     </a:p>
                   </a:txBody>
@@ -31988,6 +32108,10 @@
                       <a:r>
                         <a:t>43 (31 - 10 - 2)</a:t>
                       </a:r>
+                      <a:br/>
+                      <a:r>
+                        <a:t> (⬇ + 3.0)</a:t>
+                      </a:r>
                     </a:p>
                   </a:txBody>
                   <a:tcPr anchor="ctr">
@@ -32040,7 +32164,11 @@
                         </a:defRPr>
                       </a:pPr>
                       <a:r>
-                        <a:t>84.09% - 9.11% - 6.81%</a:t>
+                        <a:t>84.29% - 9.06% - 6.66%</a:t>
+                      </a:r>
+                      <a:br/>
+                      <a:r>
+                        <a:t> (⬆ - 0.51% / ⬇ + 3.59%)</a:t>
                       </a:r>
                     </a:p>
                   </a:txBody>
@@ -32193,11 +32321,11 @@
                         </a:defRPr>
                       </a:pPr>
                       <a:r>
-                        <a:t>🟡 6d 13h</a:t>
+                        <a:t>🟡 6d 14h</a:t>
                       </a:r>
                       <a:br/>
                       <a:r>
-                        <a:t> (⬇ + 18h 31m)</a:t>
+                        <a:t> (⬇ + 19h 41m)</a:t>
                       </a:r>
                     </a:p>
                   </a:txBody>
@@ -32249,6 +32377,10 @@
                       <a:r>
                         <a:t>2 / 1</a:t>
                       </a:r>
+                      <a:br/>
+                      <a:r>
+                        <a:t> (=)</a:t>
+                      </a:r>
                     </a:p>
                   </a:txBody>
                   <a:tcPr anchor="ctr">
@@ -32294,6 +32426,10 @@
                       </a:pPr>
                       <a:r>
                         <a:t>1 / 0</a:t>
+                      </a:r>
+                      <a:br/>
+                      <a:r>
+                        <a:t> (⬇ + 1.0)</a:t>
                       </a:r>
                     </a:p>
                   </a:txBody>
@@ -32341,6 +32477,10 @@
                       <a:r>
                         <a:t>39 (18 - 12 - 9)</a:t>
                       </a:r>
+                      <a:br/>
+                      <a:r>
+                        <a:t> (⬆ - 2.0)</a:t>
+                      </a:r>
                     </a:p>
                   </a:txBody>
                   <a:tcPr anchor="ctr">
@@ -32385,7 +32525,11 @@
                         </a:defRPr>
                       </a:pPr>
                       <a:r>
-                        <a:t>68.12% - 9.82% - 22.07%</a:t>
+                        <a:t>68.09% - 9.59% - 22.32%</a:t>
+                      </a:r>
+                      <a:br/>
+                      <a:r>
+                        <a:t> (⬆ - 13.44% / ⬇ + 18.19%)</a:t>
                       </a:r>
                     </a:p>
                   </a:txBody>
@@ -32443,7 +32587,7 @@
         </p:nvSpPr>
         <p:spPr>
           <a:xfrm>
-            <a:off x="215230" y="75286"/>
+            <a:off x="134548" y="-18843"/>
             <a:ext cx="8878814" cy="738664"/>
           </a:xfrm>
           <a:prstGeom prst="rect">
@@ -32494,7 +32638,7 @@
               <a:defRPr/>
             </a:pPr>
             <a:r>
-              <a:rPr lang="es-ES" sz="4800">
+              <a:rPr lang="es-ES" sz="4800" dirty="0">
                 <a:solidFill>
                   <a:srgbClr val="5B008D"/>
                 </a:solidFill>
@@ -32503,7 +32647,7 @@
               </a:rPr>
               <a:t>Consolidado de Métricas</a:t>
             </a:r>
-            <a:endParaRPr lang="es-ES" sz="4800">
+            <a:endParaRPr lang="es-ES" sz="4800" dirty="0">
               <a:solidFill>
                 <a:srgbClr val="5B008D"/>
               </a:solidFill>
@@ -32528,7 +32672,7 @@
         </p:nvSpPr>
         <p:spPr>
           <a:xfrm>
-            <a:off x="232746" y="694605"/>
+            <a:off x="125170" y="640817"/>
             <a:ext cx="8878814" cy="276999"/>
           </a:xfrm>
           <a:prstGeom prst="rect">
@@ -32611,7 +32755,7 @@
         </p:nvSpPr>
         <p:spPr>
           <a:xfrm>
-            <a:off x="9106039" y="1007682"/>
+            <a:off x="9132933" y="1061470"/>
             <a:ext cx="2978704" cy="5597023"/>
           </a:xfrm>
           <a:prstGeom prst="roundRect">
@@ -32705,7 +32849,7 @@
         </p:nvGrpSpPr>
         <p:grpSpPr>
           <a:xfrm>
-            <a:off x="9191296" y="1099216"/>
+            <a:off x="9218190" y="1153004"/>
             <a:ext cx="2890523" cy="1305015"/>
             <a:chOff x="9182538" y="1615975"/>
             <a:chExt cx="2899281" cy="1226188"/>
@@ -32980,7 +33124,7 @@
         </p:nvGrpSpPr>
         <p:grpSpPr>
           <a:xfrm>
-            <a:off x="9191296" y="2473433"/>
+            <a:off x="9218190" y="2527221"/>
             <a:ext cx="2813270" cy="846843"/>
             <a:chOff x="9191296" y="2911364"/>
             <a:chExt cx="2813270" cy="846843"/>
@@ -33233,7 +33377,7 @@
         </p:blipFill>
         <p:spPr>
           <a:xfrm>
-            <a:off x="9191295" y="3937008"/>
+            <a:off x="9218189" y="3990796"/>
             <a:ext cx="2804512" cy="2557499"/>
           </a:xfrm>
           <a:prstGeom prst="rect">
@@ -33255,7 +33399,7 @@
         </p:nvSpPr>
         <p:spPr>
           <a:xfrm>
-            <a:off x="9239466" y="3936124"/>
+            <a:off x="9266360" y="3989912"/>
             <a:ext cx="2462925" cy="246221"/>
           </a:xfrm>
           <a:prstGeom prst="rect">
@@ -33302,7 +33446,7 @@
         </p:nvSpPr>
         <p:spPr>
           <a:xfrm>
-            <a:off x="9254535" y="4203766"/>
+            <a:off x="9281429" y="4257554"/>
             <a:ext cx="2751958" cy="2246769"/>
           </a:xfrm>
           <a:prstGeom prst="rect">
@@ -33560,7 +33704,7 @@
         </p:nvGrpSpPr>
         <p:grpSpPr>
           <a:xfrm>
-            <a:off x="9191294" y="3217914"/>
+            <a:off x="9218188" y="3271702"/>
             <a:ext cx="2804512" cy="622731"/>
             <a:chOff x="9182536" y="3647087"/>
             <a:chExt cx="2839545" cy="622731"/>

</xml_diff>

<commit_message>
criado um novo template "informe lideres" que avalia os dados de cada colaborador tech do time
</commit_message>
<xml_diff>
--- a/Noviembre - Deck de Metricas.pptx
+++ b/Noviembre - Deck de Metricas.pptx
@@ -29382,11 +29382,11 @@
                         </a:defRPr>
                       </a:pPr>
                       <a:r>
-                        <a:t>🟡 11d 14h</a:t>
+                        <a:t>🟡 11d 15h</a:t>
                       </a:r>
                       <a:br/>
                       <a:r>
-                        <a:t> (⬇ + 3d 12h)</a:t>
+                        <a:t> (⬇ + 3d 13h)</a:t>
                       </a:r>
                     </a:p>
                   </a:txBody>
@@ -29878,7 +29878,7 @@
                       </a:r>
                       <a:br/>
                       <a:r>
-                        <a:t> (⬇ + 9.0)</a:t>
+                        <a:t> (⬇ - 9.0)</a:t>
                       </a:r>
                     </a:p>
                   </a:txBody>
@@ -30208,7 +30208,7 @@
                       </a:r>
                       <a:br/>
                       <a:r>
-                        <a:t> (⬆ - 7.0)</a:t>
+                        <a:t> (⬆ + 7.0)</a:t>
                       </a:r>
                     </a:p>
                   </a:txBody>
@@ -30811,11 +30811,11 @@
                         </a:defRPr>
                       </a:pPr>
                       <a:r>
-                        <a:t>🔵 4d 18h</a:t>
+                        <a:t>🔵 4d 19h</a:t>
                       </a:r>
                       <a:br/>
                       <a:r>
-                        <a:t> (⬇ + 1h 12m)</a:t>
+                        <a:t> (⬇ + 2h 5m)</a:t>
                       </a:r>
                     </a:p>
                   </a:txBody>
@@ -30977,7 +30977,7 @@
                       </a:r>
                       <a:br/>
                       <a:r>
-                        <a:t> (⬆ - 1.0)</a:t>
+                        <a:t> (⬆ + 1.0)</a:t>
                       </a:r>
                     </a:p>
                   </a:txBody>
@@ -31326,7 +31326,7 @@
                       </a:r>
                       <a:br/>
                       <a:r>
-                        <a:t> (⬇ + 4.0)</a:t>
+                        <a:t> (⬇ - 4.0)</a:t>
                       </a:r>
                     </a:p>
                   </a:txBody>
@@ -32110,7 +32110,7 @@
                       </a:r>
                       <a:br/>
                       <a:r>
-                        <a:t> (⬇ + 3.0)</a:t>
+                        <a:t> (⬇ - 3.0)</a:t>
                       </a:r>
                     </a:p>
                   </a:txBody>
@@ -32325,7 +32325,7 @@
                       </a:r>
                       <a:br/>
                       <a:r>
-                        <a:t> (⬇ + 19h 41m)</a:t>
+                        <a:t> (⬇ + 20h 9m)</a:t>
                       </a:r>
                     </a:p>
                   </a:txBody>
@@ -32479,7 +32479,7 @@
                       </a:r>
                       <a:br/>
                       <a:r>
-                        <a:t> (⬆ - 2.0)</a:t>
+                        <a:t> (⬆ + 2.0)</a:t>
                       </a:r>
                     </a:p>
                   </a:txBody>

</xml_diff>